<commit_message>
PPT with Text, integrated into sahil notebook
</commit_message>
<xml_diff>
--- a/Phase4/Powerpoint/Group10_Phase4_Presentation.pptx
+++ b/Phase4/Powerpoint/Group10_Phase4_Presentation.pptx
@@ -67,9 +67,9 @@
         </a:solidFill>
         <a:effectLst/>
         <a:uFillTx/>
-        <a:latin typeface="+mn-lt"/>
-        <a:ea typeface="+mn-ea"/>
-        <a:cs typeface="+mn-cs"/>
+        <a:latin typeface="+mj-lt"/>
+        <a:ea typeface="+mj-ea"/>
+        <a:cs typeface="+mj-cs"/>
         <a:sym typeface="Helvetica Neue"/>
       </a:defRPr>
     </a:lvl1pPr>
@@ -97,9 +97,9 @@
         </a:solidFill>
         <a:effectLst/>
         <a:uFillTx/>
-        <a:latin typeface="+mn-lt"/>
-        <a:ea typeface="+mn-ea"/>
-        <a:cs typeface="+mn-cs"/>
+        <a:latin typeface="+mj-lt"/>
+        <a:ea typeface="+mj-ea"/>
+        <a:cs typeface="+mj-cs"/>
         <a:sym typeface="Helvetica Neue"/>
       </a:defRPr>
     </a:lvl2pPr>
@@ -127,9 +127,9 @@
         </a:solidFill>
         <a:effectLst/>
         <a:uFillTx/>
-        <a:latin typeface="+mn-lt"/>
-        <a:ea typeface="+mn-ea"/>
-        <a:cs typeface="+mn-cs"/>
+        <a:latin typeface="+mj-lt"/>
+        <a:ea typeface="+mj-ea"/>
+        <a:cs typeface="+mj-cs"/>
         <a:sym typeface="Helvetica Neue"/>
       </a:defRPr>
     </a:lvl3pPr>
@@ -157,9 +157,9 @@
         </a:solidFill>
         <a:effectLst/>
         <a:uFillTx/>
-        <a:latin typeface="+mn-lt"/>
-        <a:ea typeface="+mn-ea"/>
-        <a:cs typeface="+mn-cs"/>
+        <a:latin typeface="+mj-lt"/>
+        <a:ea typeface="+mj-ea"/>
+        <a:cs typeface="+mj-cs"/>
         <a:sym typeface="Helvetica Neue"/>
       </a:defRPr>
     </a:lvl4pPr>
@@ -187,9 +187,9 @@
         </a:solidFill>
         <a:effectLst/>
         <a:uFillTx/>
-        <a:latin typeface="+mn-lt"/>
-        <a:ea typeface="+mn-ea"/>
-        <a:cs typeface="+mn-cs"/>
+        <a:latin typeface="+mj-lt"/>
+        <a:ea typeface="+mj-ea"/>
+        <a:cs typeface="+mj-cs"/>
         <a:sym typeface="Helvetica Neue"/>
       </a:defRPr>
     </a:lvl5pPr>
@@ -217,9 +217,9 @@
         </a:solidFill>
         <a:effectLst/>
         <a:uFillTx/>
-        <a:latin typeface="+mn-lt"/>
-        <a:ea typeface="+mn-ea"/>
-        <a:cs typeface="+mn-cs"/>
+        <a:latin typeface="+mj-lt"/>
+        <a:ea typeface="+mj-ea"/>
+        <a:cs typeface="+mj-cs"/>
         <a:sym typeface="Helvetica Neue"/>
       </a:defRPr>
     </a:lvl6pPr>
@@ -247,9 +247,9 @@
         </a:solidFill>
         <a:effectLst/>
         <a:uFillTx/>
-        <a:latin typeface="+mn-lt"/>
-        <a:ea typeface="+mn-ea"/>
-        <a:cs typeface="+mn-cs"/>
+        <a:latin typeface="+mj-lt"/>
+        <a:ea typeface="+mj-ea"/>
+        <a:cs typeface="+mj-cs"/>
         <a:sym typeface="Helvetica Neue"/>
       </a:defRPr>
     </a:lvl7pPr>
@@ -277,9 +277,9 @@
         </a:solidFill>
         <a:effectLst/>
         <a:uFillTx/>
-        <a:latin typeface="+mn-lt"/>
-        <a:ea typeface="+mn-ea"/>
-        <a:cs typeface="+mn-cs"/>
+        <a:latin typeface="+mj-lt"/>
+        <a:ea typeface="+mj-ea"/>
+        <a:cs typeface="+mj-cs"/>
         <a:sym typeface="Helvetica Neue"/>
       </a:defRPr>
     </a:lvl8pPr>
@@ -307,9 +307,9 @@
         </a:solidFill>
         <a:effectLst/>
         <a:uFillTx/>
-        <a:latin typeface="+mn-lt"/>
-        <a:ea typeface="+mn-ea"/>
-        <a:cs typeface="+mn-cs"/>
+        <a:latin typeface="+mj-lt"/>
+        <a:ea typeface="+mj-ea"/>
+        <a:cs typeface="+mj-cs"/>
         <a:sym typeface="Helvetica Neue"/>
       </a:defRPr>
     </a:lvl9pPr>
@@ -394,73 +394,73 @@
   <p:notesStyle>
     <a:lvl1pPr latinLnBrk="0">
       <a:defRPr sz="1200">
-        <a:latin typeface="+mn-lt"/>
-        <a:ea typeface="+mn-ea"/>
-        <a:cs typeface="+mn-cs"/>
+        <a:latin typeface="+mj-lt"/>
+        <a:ea typeface="+mj-ea"/>
+        <a:cs typeface="+mj-cs"/>
         <a:sym typeface="Helvetica Neue"/>
       </a:defRPr>
     </a:lvl1pPr>
     <a:lvl2pPr indent="228600" latinLnBrk="0">
       <a:defRPr sz="1200">
-        <a:latin typeface="+mn-lt"/>
-        <a:ea typeface="+mn-ea"/>
-        <a:cs typeface="+mn-cs"/>
+        <a:latin typeface="+mj-lt"/>
+        <a:ea typeface="+mj-ea"/>
+        <a:cs typeface="+mj-cs"/>
         <a:sym typeface="Helvetica Neue"/>
       </a:defRPr>
     </a:lvl2pPr>
     <a:lvl3pPr indent="457200" latinLnBrk="0">
       <a:defRPr sz="1200">
-        <a:latin typeface="+mn-lt"/>
-        <a:ea typeface="+mn-ea"/>
-        <a:cs typeface="+mn-cs"/>
+        <a:latin typeface="+mj-lt"/>
+        <a:ea typeface="+mj-ea"/>
+        <a:cs typeface="+mj-cs"/>
         <a:sym typeface="Helvetica Neue"/>
       </a:defRPr>
     </a:lvl3pPr>
     <a:lvl4pPr indent="685800" latinLnBrk="0">
       <a:defRPr sz="1200">
-        <a:latin typeface="+mn-lt"/>
-        <a:ea typeface="+mn-ea"/>
-        <a:cs typeface="+mn-cs"/>
+        <a:latin typeface="+mj-lt"/>
+        <a:ea typeface="+mj-ea"/>
+        <a:cs typeface="+mj-cs"/>
         <a:sym typeface="Helvetica Neue"/>
       </a:defRPr>
     </a:lvl4pPr>
     <a:lvl5pPr indent="914400" latinLnBrk="0">
       <a:defRPr sz="1200">
-        <a:latin typeface="+mn-lt"/>
-        <a:ea typeface="+mn-ea"/>
-        <a:cs typeface="+mn-cs"/>
+        <a:latin typeface="+mj-lt"/>
+        <a:ea typeface="+mj-ea"/>
+        <a:cs typeface="+mj-cs"/>
         <a:sym typeface="Helvetica Neue"/>
       </a:defRPr>
     </a:lvl5pPr>
     <a:lvl6pPr indent="1143000" latinLnBrk="0">
       <a:defRPr sz="1200">
-        <a:latin typeface="+mn-lt"/>
-        <a:ea typeface="+mn-ea"/>
-        <a:cs typeface="+mn-cs"/>
+        <a:latin typeface="+mj-lt"/>
+        <a:ea typeface="+mj-ea"/>
+        <a:cs typeface="+mj-cs"/>
         <a:sym typeface="Helvetica Neue"/>
       </a:defRPr>
     </a:lvl6pPr>
     <a:lvl7pPr indent="1371600" latinLnBrk="0">
       <a:defRPr sz="1200">
-        <a:latin typeface="+mn-lt"/>
-        <a:ea typeface="+mn-ea"/>
-        <a:cs typeface="+mn-cs"/>
+        <a:latin typeface="+mj-lt"/>
+        <a:ea typeface="+mj-ea"/>
+        <a:cs typeface="+mj-cs"/>
         <a:sym typeface="Helvetica Neue"/>
       </a:defRPr>
     </a:lvl7pPr>
     <a:lvl8pPr indent="1600200" latinLnBrk="0">
       <a:defRPr sz="1200">
-        <a:latin typeface="+mn-lt"/>
-        <a:ea typeface="+mn-ea"/>
-        <a:cs typeface="+mn-cs"/>
+        <a:latin typeface="+mj-lt"/>
+        <a:ea typeface="+mj-ea"/>
+        <a:cs typeface="+mj-cs"/>
         <a:sym typeface="Helvetica Neue"/>
       </a:defRPr>
     </a:lvl8pPr>
     <a:lvl9pPr indent="1828800" latinLnBrk="0">
       <a:defRPr sz="1200">
-        <a:latin typeface="+mn-lt"/>
-        <a:ea typeface="+mn-ea"/>
-        <a:cs typeface="+mn-cs"/>
+        <a:latin typeface="+mj-lt"/>
+        <a:ea typeface="+mj-ea"/>
+        <a:cs typeface="+mj-cs"/>
         <a:sym typeface="Helvetica Neue"/>
       </a:defRPr>
     </a:lvl9pPr>
@@ -544,7 +544,7 @@
         <p:spPr>
           <a:xfrm>
             <a:off x="457200" y="4517280"/>
-            <a:ext cx="6581162" cy="1371242"/>
+            <a:ext cx="6581162" cy="1371243"/>
           </a:xfrm>
           <a:prstGeom prst="rect">
             <a:avLst/>
@@ -676,7 +676,7 @@
         <p:spPr>
           <a:xfrm>
             <a:off x="457200" y="4517280"/>
-            <a:ext cx="6581162" cy="1371242"/>
+            <a:ext cx="6581162" cy="1371243"/>
           </a:xfrm>
           <a:prstGeom prst="rect">
             <a:avLst/>
@@ -808,7 +808,7 @@
         <p:spPr>
           <a:xfrm>
             <a:off x="457200" y="4517280"/>
-            <a:ext cx="6581162" cy="1371242"/>
+            <a:ext cx="6581162" cy="1371243"/>
           </a:xfrm>
           <a:prstGeom prst="rect">
             <a:avLst/>
@@ -947,7 +947,7 @@
         <p:spPr>
           <a:xfrm>
             <a:off x="457200" y="4517280"/>
-            <a:ext cx="6581162" cy="1371242"/>
+            <a:ext cx="6581162" cy="1371243"/>
           </a:xfrm>
           <a:prstGeom prst="rect">
             <a:avLst/>
@@ -1042,7 +1042,7 @@
                 <a:sym typeface="Calibri"/>
               </a:defRPr>
             </a:lvl2pPr>
-            <a:lvl3pPr marL="1234439" indent="-320039">
+            <a:lvl3pPr marL="1234438" indent="-320038">
               <a:lnSpc>
                 <a:spcPct val="90000"/>
               </a:lnSpc>
@@ -1148,15 +1148,15 @@
         </p:nvSpPr>
         <p:spPr>
           <a:xfrm>
-            <a:off x="11095176" y="6414760"/>
-            <a:ext cx="258624" cy="248305"/>
+            <a:off x="11095178" y="6414761"/>
+            <a:ext cx="258623" cy="248303"/>
           </a:xfrm>
           <a:prstGeom prst="rect">
             <a:avLst/>
           </a:prstGeom>
         </p:spPr>
         <p:txBody>
-          <a:bodyPr lIns="45719" tIns="45719" rIns="45719" bIns="45719"/>
+          <a:bodyPr lIns="45718" tIns="45718" rIns="45718" bIns="45718"/>
           <a:lstStyle>
             <a:lvl1pPr algn="r">
               <a:defRPr spc="0" sz="1200">
@@ -1213,7 +1213,7 @@
         <p:spPr>
           <a:xfrm>
             <a:off x="457200" y="4517280"/>
-            <a:ext cx="6581162" cy="1371242"/>
+            <a:ext cx="6581162" cy="1371243"/>
           </a:xfrm>
           <a:prstGeom prst="rect">
             <a:avLst/>
@@ -1345,7 +1345,7 @@
         <p:spPr>
           <a:xfrm>
             <a:off x="457200" y="4517280"/>
-            <a:ext cx="6581162" cy="1371242"/>
+            <a:ext cx="6581162" cy="1371243"/>
           </a:xfrm>
           <a:prstGeom prst="rect">
             <a:avLst/>
@@ -1477,7 +1477,7 @@
         <p:spPr>
           <a:xfrm>
             <a:off x="457200" y="4517280"/>
-            <a:ext cx="6581162" cy="1371242"/>
+            <a:ext cx="6581162" cy="1371243"/>
           </a:xfrm>
           <a:prstGeom prst="rect">
             <a:avLst/>
@@ -1609,7 +1609,7 @@
         <p:spPr>
           <a:xfrm>
             <a:off x="457200" y="4517280"/>
-            <a:ext cx="6581162" cy="1371242"/>
+            <a:ext cx="6581162" cy="1371243"/>
           </a:xfrm>
           <a:prstGeom prst="rect">
             <a:avLst/>
@@ -1789,7 +1789,7 @@
         <p:spPr>
           <a:xfrm>
             <a:off x="457200" y="4517280"/>
-            <a:ext cx="6581162" cy="1371242"/>
+            <a:ext cx="6581162" cy="1371243"/>
           </a:xfrm>
           <a:prstGeom prst="rect">
             <a:avLst/>
@@ -1921,7 +1921,7 @@
         <p:spPr>
           <a:xfrm>
             <a:off x="457200" y="4517280"/>
-            <a:ext cx="6581162" cy="1371242"/>
+            <a:ext cx="6581162" cy="1371243"/>
           </a:xfrm>
           <a:prstGeom prst="rect">
             <a:avLst/>
@@ -2053,7 +2053,7 @@
         <p:spPr>
           <a:xfrm>
             <a:off x="457200" y="4517280"/>
-            <a:ext cx="6581162" cy="1371242"/>
+            <a:ext cx="6581162" cy="1371243"/>
           </a:xfrm>
           <a:prstGeom prst="rect">
             <a:avLst/>
@@ -2287,8 +2287,8 @@
         </p:nvSpPr>
         <p:spPr>
           <a:xfrm>
-            <a:off x="8439839" y="6145465"/>
-            <a:ext cx="408685" cy="421391"/>
+            <a:off x="8439839" y="6145466"/>
+            <a:ext cx="408683" cy="421389"/>
           </a:xfrm>
           <a:prstGeom prst="rect">
             <a:avLst/>
@@ -2602,7 +2602,7 @@
           <a:sym typeface="Segoe UI"/>
         </a:defRPr>
       </a:lvl1pPr>
-      <a:lvl2pPr marL="0" marR="0" indent="539999" algn="l" defTabSz="914400" rtl="0" latinLnBrk="0">
+      <a:lvl2pPr marL="0" marR="0" indent="0" algn="l" defTabSz="914400" rtl="0" latinLnBrk="0">
         <a:lnSpc>
           <a:spcPts val="2800"/>
         </a:lnSpc>
@@ -2630,7 +2630,7 @@
           <a:sym typeface="Segoe UI"/>
         </a:defRPr>
       </a:lvl2pPr>
-      <a:lvl3pPr marL="0" marR="0" indent="1007998" algn="l" defTabSz="914400" rtl="0" latinLnBrk="0">
+      <a:lvl3pPr marL="0" marR="0" indent="0" algn="l" defTabSz="914400" rtl="0" latinLnBrk="0">
         <a:lnSpc>
           <a:spcPts val="2800"/>
         </a:lnSpc>
@@ -2658,7 +2658,7 @@
           <a:sym typeface="Segoe UI"/>
         </a:defRPr>
       </a:lvl3pPr>
-      <a:lvl4pPr marL="0" marR="0" indent="1511999" algn="l" defTabSz="914400" rtl="0" latinLnBrk="0">
+      <a:lvl4pPr marL="0" marR="0" indent="0" algn="l" defTabSz="914400" rtl="0" latinLnBrk="0">
         <a:lnSpc>
           <a:spcPts val="2800"/>
         </a:lnSpc>
@@ -2686,7 +2686,7 @@
           <a:sym typeface="Segoe UI"/>
         </a:defRPr>
       </a:lvl4pPr>
-      <a:lvl5pPr marL="0" marR="0" indent="1943999" algn="l" defTabSz="914400" rtl="0" latinLnBrk="0">
+      <a:lvl5pPr marL="0" marR="0" indent="0" algn="l" defTabSz="914400" rtl="0" latinLnBrk="0">
         <a:lnSpc>
           <a:spcPts val="2800"/>
         </a:lnSpc>
@@ -2714,7 +2714,7 @@
           <a:sym typeface="Segoe UI"/>
         </a:defRPr>
       </a:lvl5pPr>
-      <a:lvl6pPr marL="0" marR="0" indent="2375999" algn="l" defTabSz="914400" rtl="0" latinLnBrk="0">
+      <a:lvl6pPr marL="0" marR="0" indent="0" algn="l" defTabSz="914400" rtl="0" latinLnBrk="0">
         <a:lnSpc>
           <a:spcPts val="2800"/>
         </a:lnSpc>
@@ -2742,7 +2742,7 @@
           <a:sym typeface="Segoe UI"/>
         </a:defRPr>
       </a:lvl6pPr>
-      <a:lvl7pPr marL="0" marR="0" indent="2807999" algn="l" defTabSz="914400" rtl="0" latinLnBrk="0">
+      <a:lvl7pPr marL="0" marR="0" indent="0" algn="l" defTabSz="914400" rtl="0" latinLnBrk="0">
         <a:lnSpc>
           <a:spcPts val="2800"/>
         </a:lnSpc>
@@ -3123,8 +3123,8 @@
         </p:nvSpPr>
         <p:spPr>
           <a:xfrm>
-            <a:off x="864673" y="122488"/>
-            <a:ext cx="3849127" cy="1614243"/>
+            <a:off x="864672" y="122487"/>
+            <a:ext cx="3849129" cy="1614245"/>
           </a:xfrm>
           <a:prstGeom prst="rect">
             <a:avLst/>
@@ -3333,8 +3333,8 @@
         </p:nvSpPr>
         <p:spPr>
           <a:xfrm>
-            <a:off x="100004" y="1830854"/>
-            <a:ext cx="5378465" cy="4656062"/>
+            <a:off x="100003" y="1830853"/>
+            <a:ext cx="5378467" cy="4656064"/>
           </a:xfrm>
           <a:custGeom>
             <a:avLst/>
@@ -3435,8 +3435,8 @@
         </p:nvSpPr>
         <p:spPr>
           <a:xfrm>
-            <a:off x="5964404" y="-53453"/>
-            <a:ext cx="6403028" cy="1091519"/>
+            <a:off x="5964404" y="-53454"/>
+            <a:ext cx="6403029" cy="1091521"/>
           </a:xfrm>
           <a:prstGeom prst="rect">
             <a:avLst/>
@@ -3486,8 +3486,8 @@
         </p:nvSpPr>
         <p:spPr>
           <a:xfrm>
-            <a:off x="5830051" y="2128670"/>
-            <a:ext cx="5301601" cy="3768795"/>
+            <a:off x="5830051" y="2128669"/>
+            <a:ext cx="5301601" cy="3768797"/>
           </a:xfrm>
           <a:prstGeom prst="rect">
             <a:avLst/>
@@ -3523,7 +3523,7 @@
             </a:pPr>
           </a:p>
           <a:p>
-            <a:pPr marL="308043" indent="-308043" defTabSz="585215">
+            <a:pPr marL="308042" indent="-308042" defTabSz="585215">
               <a:lnSpc>
                 <a:spcPct val="90000"/>
               </a:lnSpc>
@@ -3550,7 +3550,7 @@
             <a:endParaRPr spc="-64"/>
           </a:p>
           <a:p>
-            <a:pPr marL="308043" indent="-308043" defTabSz="585215">
+            <a:pPr marL="308042" indent="-308042" defTabSz="585215">
               <a:lnSpc>
                 <a:spcPct val="90000"/>
               </a:lnSpc>
@@ -3577,7 +3577,7 @@
             <a:endParaRPr spc="-64"/>
           </a:p>
           <a:p>
-            <a:pPr marL="308043" indent="-308043" defTabSz="585215">
+            <a:pPr marL="308042" indent="-308042" defTabSz="585215">
               <a:lnSpc>
                 <a:spcPct val="90000"/>
               </a:lnSpc>
@@ -3611,8 +3611,8 @@
         </p:nvSpPr>
         <p:spPr>
           <a:xfrm>
-            <a:off x="5984723" y="1366582"/>
-            <a:ext cx="5666762" cy="1204594"/>
+            <a:off x="5984722" y="1366581"/>
+            <a:ext cx="5666764" cy="1204595"/>
           </a:xfrm>
           <a:prstGeom prst="rect">
             <a:avLst/>
@@ -3697,8 +3697,8 @@
         </p:blipFill>
         <p:spPr>
           <a:xfrm>
-            <a:off x="-418460" y="-236551"/>
-            <a:ext cx="15132907" cy="7311087"/>
+            <a:off x="-418461" y="-226544"/>
+            <a:ext cx="15132909" cy="7311088"/>
           </a:xfrm>
           <a:prstGeom prst="rect">
             <a:avLst/>
@@ -3719,7 +3719,7 @@
         <p:spPr>
           <a:xfrm>
             <a:off x="89998" y="-236551"/>
-            <a:ext cx="11619004" cy="586605"/>
+            <a:ext cx="11619004" cy="586606"/>
           </a:xfrm>
           <a:prstGeom prst="rect">
             <a:avLst/>
@@ -3729,8 +3729,8 @@
           <a:bodyPr anchor="t"/>
           <a:lstStyle/>
           <a:p>
-            <a:pPr algn="ctr" defTabSz="768095">
-              <a:defRPr spc="-84" sz="1764">
+            <a:pPr algn="ctr" defTabSz="768094">
+              <a:defRPr spc="-100" sz="1700">
                 <a:solidFill>
                   <a:srgbClr val="15C6C3"/>
                 </a:solidFill>
@@ -3755,8 +3755,8 @@
         </p:nvSpPr>
         <p:spPr>
           <a:xfrm>
-            <a:off x="-1" y="560577"/>
-            <a:ext cx="5119034" cy="1268223"/>
+            <a:off x="-2" y="560577"/>
+            <a:ext cx="5119036" cy="1268224"/>
           </a:xfrm>
           <a:prstGeom prst="rect">
             <a:avLst/>
@@ -3864,8 +3864,8 @@
         </p:nvSpPr>
         <p:spPr>
           <a:xfrm>
-            <a:off x="-2" y="2265143"/>
-            <a:ext cx="5283739" cy="1139595"/>
+            <a:off x="11573" y="1818469"/>
+            <a:ext cx="5283741" cy="1139596"/>
           </a:xfrm>
           <a:prstGeom prst="rect">
             <a:avLst/>
@@ -3929,7 +3929,7 @@
             <a:r>
               <a:t>This class reduces features by measuring collinearity between the input variables and target.</a:t>
             </a:r>
-            <a:endParaRPr spc="-118" sz="1300"/>
+            <a:endParaRPr spc="-117" sz="1300"/>
           </a:p>
           <a:p>
             <a:pPr defTabSz="905255">
@@ -3982,8 +3982,8 @@
         </p:nvSpPr>
         <p:spPr>
           <a:xfrm>
-            <a:off x="-2" y="3841082"/>
-            <a:ext cx="5306891" cy="1350910"/>
+            <a:off x="-11579" y="3101507"/>
+            <a:ext cx="5306893" cy="1350911"/>
           </a:xfrm>
           <a:prstGeom prst="rect">
             <a:avLst/>
@@ -4049,13 +4049,7 @@
             </a:r>
             <a:br/>
             <a:r>
-              <a:t>EXT_SOURCE_3 ,  EXT_SOURCE_2 , EXT_SOURCE_1, CNT_DRAWINGS_ATM_CURRENT_mean ,CNT_DRAWINGS_</a:t>
-            </a:r>
-            <a:r>
-              <a:t> </a:t>
-            </a:r>
-            <a:r>
-              <a:t>CURRENT_max</a:t>
+              <a:t>EXT_SOURCE_3 ,  EXT_SOURCE_2 , EXT_SOURCE_1, CNT_DRAWINGS_ATM_CURRENT_mean ,CNT_DRAWINGS_ CURRENT_max</a:t>
             </a:r>
             <a:br/>
             <a:endParaRPr spc="-76"/>
@@ -4102,22 +4096,6 @@
               </a:defRPr>
             </a:pPr>
           </a:p>
-          <a:p>
-            <a:pPr>
-              <a:lnSpc>
-                <a:spcPct val="72000"/>
-              </a:lnSpc>
-              <a:defRPr cap="all" spc="-76" sz="1100">
-                <a:solidFill>
-                  <a:srgbClr val="F0F233"/>
-                </a:solidFill>
-                <a:latin typeface="Copperplate"/>
-                <a:ea typeface="Copperplate"/>
-                <a:cs typeface="Copperplate"/>
-                <a:sym typeface="Copperplate"/>
-              </a:defRPr>
-            </a:pPr>
-          </a:p>
         </p:txBody>
       </p:sp>
       <p:pic>
@@ -4139,7 +4117,7 @@
         <p:spPr>
           <a:xfrm>
             <a:off x="6272757" y="325795"/>
-            <a:ext cx="5511341" cy="1522256"/>
+            <a:ext cx="5511342" cy="1522257"/>
           </a:xfrm>
           <a:prstGeom prst="rect">
             <a:avLst/>
@@ -4167,8 +4145,8 @@
         </p:blipFill>
         <p:spPr>
           <a:xfrm>
-            <a:off x="6289585" y="1913075"/>
-            <a:ext cx="4077671" cy="1345103"/>
+            <a:off x="6559817" y="1978977"/>
+            <a:ext cx="2863535" cy="944597"/>
           </a:xfrm>
           <a:prstGeom prst="rect">
             <a:avLst/>
@@ -4196,8 +4174,8 @@
         </p:blipFill>
         <p:spPr>
           <a:xfrm>
-            <a:off x="6336669" y="3290439"/>
-            <a:ext cx="4805754" cy="471010"/>
+            <a:off x="9499864" y="2208309"/>
+            <a:ext cx="2448037" cy="239932"/>
           </a:xfrm>
           <a:prstGeom prst="rect">
             <a:avLst/>
@@ -4225,8 +4203,8 @@
         </p:blipFill>
         <p:spPr>
           <a:xfrm>
-            <a:off x="6365187" y="3917698"/>
-            <a:ext cx="2401780" cy="1499835"/>
+            <a:off x="6511797" y="3077444"/>
+            <a:ext cx="2240365" cy="1399037"/>
           </a:xfrm>
           <a:prstGeom prst="rect">
             <a:avLst/>
@@ -4254,8 +4232,8 @@
         </p:blipFill>
         <p:spPr>
           <a:xfrm>
-            <a:off x="8924966" y="4881895"/>
-            <a:ext cx="2949876" cy="652566"/>
+            <a:off x="8961674" y="3929914"/>
+            <a:ext cx="2527784" cy="559193"/>
           </a:xfrm>
           <a:prstGeom prst="rect">
             <a:avLst/>
@@ -4283,8 +4261,8 @@
         </p:blipFill>
         <p:spPr>
           <a:xfrm>
-            <a:off x="8931843" y="3924493"/>
-            <a:ext cx="2260009" cy="900746"/>
+            <a:off x="8961674" y="3054499"/>
+            <a:ext cx="2260010" cy="900747"/>
           </a:xfrm>
           <a:prstGeom prst="rect">
             <a:avLst/>
@@ -4302,8 +4280,8 @@
         </p:nvSpPr>
         <p:spPr>
           <a:xfrm>
-            <a:off x="5399103" y="2703939"/>
-            <a:ext cx="890482" cy="184168"/>
+            <a:off x="5399103" y="2236191"/>
+            <a:ext cx="890482" cy="184169"/>
           </a:xfrm>
           <a:prstGeom prst="rightArrow">
             <a:avLst>
@@ -4321,7 +4299,7 @@
           </a:ln>
         </p:spPr>
         <p:txBody>
-          <a:bodyPr lIns="45719" rIns="45719"/>
+          <a:bodyPr lIns="0" tIns="0" rIns="0" bIns="0"/>
           <a:lstStyle/>
           <a:p>
             <a:pPr>
@@ -4353,8 +4331,8 @@
         </p:blipFill>
         <p:spPr>
           <a:xfrm>
-            <a:off x="6386097" y="5823143"/>
-            <a:ext cx="3429001" cy="788980"/>
+            <a:off x="6539869" y="4710119"/>
+            <a:ext cx="3429003" cy="788981"/>
           </a:xfrm>
           <a:prstGeom prst="rect">
             <a:avLst/>
@@ -4372,8 +4350,8 @@
         </p:nvSpPr>
         <p:spPr>
           <a:xfrm>
-            <a:off x="462347" y="5713529"/>
-            <a:ext cx="4382194" cy="1240903"/>
+            <a:off x="150547" y="4280028"/>
+            <a:ext cx="4382195" cy="1088503"/>
           </a:xfrm>
           <a:prstGeom prst="rect">
             <a:avLst/>
@@ -4488,6 +4466,175 @@
               </a:defRPr>
             </a:pPr>
           </a:p>
+        </p:txBody>
+      </p:sp>
+      <p:sp>
+        <p:nvSpPr>
+          <p:cNvPr id="147" name="Arrow"/>
+          <p:cNvSpPr/>
+          <p:nvPr/>
+        </p:nvSpPr>
+        <p:spPr>
+          <a:xfrm>
+            <a:off x="5454259" y="5012525"/>
+            <a:ext cx="890482" cy="184169"/>
+          </a:xfrm>
+          <a:prstGeom prst="rightArrow">
+            <a:avLst>
+              <a:gd name="adj1" fmla="val 32000"/>
+              <a:gd name="adj2" fmla="val 157961"/>
+            </a:avLst>
+          </a:prstGeom>
+          <a:solidFill>
+            <a:srgbClr val="000000"/>
+          </a:solidFill>
+          <a:ln w="25400">
+            <a:solidFill>
+              <a:srgbClr val="4472C4"/>
+            </a:solidFill>
+          </a:ln>
+        </p:spPr>
+        <p:txBody>
+          <a:bodyPr lIns="0" tIns="0" rIns="0" bIns="0"/>
+          <a:lstStyle/>
+          <a:p>
+            <a:pPr>
+              <a:defRPr>
+                <a:latin typeface="Calibri"/>
+                <a:ea typeface="Calibri"/>
+                <a:cs typeface="Calibri"/>
+                <a:sym typeface="Calibri"/>
+              </a:defRPr>
+            </a:pPr>
+          </a:p>
+        </p:txBody>
+      </p:sp>
+      <p:sp>
+        <p:nvSpPr>
+          <p:cNvPr id="148" name="Arrow"/>
+          <p:cNvSpPr/>
+          <p:nvPr/>
+        </p:nvSpPr>
+        <p:spPr>
+          <a:xfrm>
+            <a:off x="5399103" y="3519954"/>
+            <a:ext cx="890482" cy="184169"/>
+          </a:xfrm>
+          <a:prstGeom prst="rightArrow">
+            <a:avLst>
+              <a:gd name="adj1" fmla="val 32000"/>
+              <a:gd name="adj2" fmla="val 157961"/>
+            </a:avLst>
+          </a:prstGeom>
+          <a:solidFill>
+            <a:srgbClr val="000000"/>
+          </a:solidFill>
+          <a:ln w="25400">
+            <a:solidFill>
+              <a:srgbClr val="4472C4"/>
+            </a:solidFill>
+          </a:ln>
+        </p:spPr>
+        <p:txBody>
+          <a:bodyPr lIns="0" tIns="0" rIns="0" bIns="0"/>
+          <a:lstStyle/>
+          <a:p>
+            <a:pPr>
+              <a:defRPr>
+                <a:latin typeface="Calibri"/>
+                <a:ea typeface="Calibri"/>
+                <a:cs typeface="Calibri"/>
+                <a:sym typeface="Calibri"/>
+              </a:defRPr>
+            </a:pPr>
+          </a:p>
+        </p:txBody>
+      </p:sp>
+      <p:sp>
+        <p:nvSpPr>
+          <p:cNvPr id="149" name="Arrow"/>
+          <p:cNvSpPr/>
+          <p:nvPr/>
+        </p:nvSpPr>
+        <p:spPr>
+          <a:xfrm>
+            <a:off x="5287886" y="1194688"/>
+            <a:ext cx="890484" cy="184170"/>
+          </a:xfrm>
+          <a:prstGeom prst="rightArrow">
+            <a:avLst>
+              <a:gd name="adj1" fmla="val 32000"/>
+              <a:gd name="adj2" fmla="val 157961"/>
+            </a:avLst>
+          </a:prstGeom>
+          <a:solidFill>
+            <a:srgbClr val="000000"/>
+          </a:solidFill>
+          <a:ln w="25400">
+            <a:solidFill>
+              <a:srgbClr val="4472C4"/>
+            </a:solidFill>
+          </a:ln>
+        </p:spPr>
+        <p:txBody>
+          <a:bodyPr lIns="0" tIns="0" rIns="0" bIns="0"/>
+          <a:lstStyle/>
+          <a:p>
+            <a:pPr>
+              <a:defRPr>
+                <a:latin typeface="Calibri"/>
+                <a:ea typeface="Calibri"/>
+                <a:cs typeface="Calibri"/>
+                <a:sym typeface="Calibri"/>
+              </a:defRPr>
+            </a:pPr>
+          </a:p>
+        </p:txBody>
+      </p:sp>
+      <p:sp>
+        <p:nvSpPr>
+          <p:cNvPr id="150" name="TextBox 6"/>
+          <p:cNvSpPr txBox="1"/>
+          <p:nvPr/>
+        </p:nvSpPr>
+        <p:spPr>
+          <a:xfrm>
+            <a:off x="150547" y="5476450"/>
+            <a:ext cx="4382195" cy="1619495"/>
+          </a:xfrm>
+          <a:prstGeom prst="rect">
+            <a:avLst/>
+          </a:prstGeom>
+          <a:ln w="12700">
+            <a:miter lim="400000"/>
+          </a:ln>
+          <a:extLst>
+            <a:ext uri="{C572A759-6A51-4108-AA02-DFA0A04FC94B}">
+              <ma14:wrappingTextBoxFlag xmlns:ma14="http://schemas.microsoft.com/office/mac/drawingml/2011/main" val="1"/>
+            </a:ext>
+          </a:extLst>
+        </p:spPr>
+        <p:txBody>
+          <a:bodyPr lIns="0" tIns="0" rIns="0" bIns="0">
+            <a:spAutoFit/>
+          </a:bodyPr>
+          <a:lstStyle/>
+          <a:p>
+            <a:pPr algn="ctr">
+              <a:defRPr cap="all" spc="-76" sz="1200">
+                <a:solidFill>
+                  <a:srgbClr val="F0F233"/>
+                </a:solidFill>
+                <a:latin typeface="Copperplate"/>
+                <a:ea typeface="Copperplate"/>
+                <a:cs typeface="Copperplate"/>
+                <a:sym typeface="Copperplate"/>
+              </a:defRPr>
+            </a:pPr>
+            <a:r>
+              <a:t>Optimizations of MLP</a:t>
+            </a:r>
+          </a:p>
           <a:p>
             <a:pPr>
               <a:defRPr cap="all" spc="-76" sz="1200">
@@ -4501,18 +4648,154 @@
               </a:defRPr>
             </a:pPr>
           </a:p>
+          <a:p>
+            <a:pPr marL="481319" indent="-481319">
+              <a:lnSpc>
+                <a:spcPct val="70000"/>
+              </a:lnSpc>
+              <a:buClr>
+                <a:srgbClr val="000000"/>
+              </a:buClr>
+              <a:buSzPct val="100000"/>
+              <a:buFont typeface="Symbol"/>
+              <a:buChar char="·"/>
+              <a:defRPr cap="all" spc="-76" sz="1200">
+                <a:solidFill>
+                  <a:srgbClr val="F0F233"/>
+                </a:solidFill>
+                <a:latin typeface="Copperplate"/>
+                <a:ea typeface="Copperplate"/>
+                <a:cs typeface="Copperplate"/>
+                <a:sym typeface="Copperplate"/>
+              </a:defRPr>
+            </a:pPr>
+            <a:r>
+              <a:t>Through multiple configurations, the Multilayer perception was trained with different number of units, layers, and optimizers  </a:t>
+            </a:r>
+            <a:br/>
+          </a:p>
+          <a:p>
+            <a:pPr marL="481319" indent="-481319">
+              <a:lnSpc>
+                <a:spcPct val="70000"/>
+              </a:lnSpc>
+              <a:buClr>
+                <a:srgbClr val="000000"/>
+              </a:buClr>
+              <a:buSzPct val="100000"/>
+              <a:buFont typeface="Symbol"/>
+              <a:buChar char="·"/>
+              <a:defRPr cap="all" spc="-76" sz="1200">
+                <a:solidFill>
+                  <a:srgbClr val="F0F233"/>
+                </a:solidFill>
+                <a:latin typeface="Copperplate"/>
+                <a:ea typeface="Copperplate"/>
+                <a:cs typeface="Copperplate"/>
+                <a:sym typeface="Copperplate"/>
+              </a:defRPr>
+            </a:pPr>
+            <a:r>
+              <a:t>Adam was the top optimizer and 5 was the optimal number of layers with the first hidden layer at 200 or so units</a:t>
+            </a:r>
+            <a:endParaRPr sz="1300"/>
+          </a:p>
+          <a:p>
+            <a:pPr>
+              <a:defRPr cap="all" spc="-76" sz="1200">
+                <a:solidFill>
+                  <a:srgbClr val="F0F233"/>
+                </a:solidFill>
+                <a:latin typeface="Copperplate"/>
+                <a:ea typeface="Copperplate"/>
+                <a:cs typeface="Copperplate"/>
+                <a:sym typeface="Copperplate"/>
+              </a:defRPr>
+            </a:pPr>
+          </a:p>
+          <a:p>
+            <a:pPr>
+              <a:defRPr cap="all" spc="-76" sz="1200">
+                <a:solidFill>
+                  <a:srgbClr val="F0F233"/>
+                </a:solidFill>
+                <a:latin typeface="Copperplate"/>
+                <a:ea typeface="Copperplate"/>
+                <a:cs typeface="Copperplate"/>
+                <a:sym typeface="Copperplate"/>
+              </a:defRPr>
+            </a:pPr>
+          </a:p>
         </p:txBody>
       </p:sp>
+      <p:pic>
+        <p:nvPicPr>
+          <p:cNvPr id="151" name="Image" descr="Image"/>
+          <p:cNvPicPr>
+            <a:picLocks noChangeAspect="1"/>
+          </p:cNvPicPr>
+          <p:nvPr/>
+        </p:nvPicPr>
+        <p:blipFill>
+          <a:blip r:embed="rId10">
+            <a:extLst/>
+          </a:blip>
+          <a:stretch>
+            <a:fillRect/>
+          </a:stretch>
+        </p:blipFill>
+        <p:spPr>
+          <a:xfrm>
+            <a:off x="6108669" y="5832519"/>
+            <a:ext cx="5336261" cy="333828"/>
+          </a:xfrm>
+          <a:prstGeom prst="rect">
+            <a:avLst/>
+          </a:prstGeom>
+          <a:ln w="12700">
+            <a:miter lim="400000"/>
+          </a:ln>
+        </p:spPr>
+      </p:pic>
+      <p:pic>
+        <p:nvPicPr>
+          <p:cNvPr id="152" name="Image" descr="Image"/>
+          <p:cNvPicPr>
+            <a:picLocks noChangeAspect="1"/>
+          </p:cNvPicPr>
+          <p:nvPr/>
+        </p:nvPicPr>
+        <p:blipFill>
+          <a:blip r:embed="rId11">
+            <a:extLst/>
+          </a:blip>
+          <a:stretch>
+            <a:fillRect/>
+          </a:stretch>
+        </p:blipFill>
+        <p:spPr>
+          <a:xfrm>
+            <a:off x="6088889" y="6243731"/>
+            <a:ext cx="5375820" cy="385689"/>
+          </a:xfrm>
+          <a:prstGeom prst="rect">
+            <a:avLst/>
+          </a:prstGeom>
+          <a:ln w="12700">
+            <a:miter lim="400000"/>
+          </a:ln>
+        </p:spPr>
+      </p:pic>
       <p:sp>
         <p:nvSpPr>
-          <p:cNvPr id="147" name="Arrow"/>
+          <p:cNvPr id="153" name="Arrow"/>
           <p:cNvSpPr/>
           <p:nvPr/>
         </p:nvSpPr>
         <p:spPr>
           <a:xfrm>
-            <a:off x="5399103" y="6062124"/>
-            <a:ext cx="890482" cy="184168"/>
+            <a:off x="4759992" y="6101841"/>
+            <a:ext cx="1273170" cy="184169"/>
           </a:xfrm>
           <a:prstGeom prst="rightArrow">
             <a:avLst>
@@ -4530,89 +4813,7 @@
           </a:ln>
         </p:spPr>
         <p:txBody>
-          <a:bodyPr lIns="45719" rIns="45719"/>
-          <a:lstStyle/>
-          <a:p>
-            <a:pPr>
-              <a:defRPr>
-                <a:latin typeface="Calibri"/>
-                <a:ea typeface="Calibri"/>
-                <a:cs typeface="Calibri"/>
-                <a:sym typeface="Calibri"/>
-              </a:defRPr>
-            </a:pPr>
-          </a:p>
-        </p:txBody>
-      </p:sp>
-      <p:sp>
-        <p:nvSpPr>
-          <p:cNvPr id="148" name="Arrow"/>
-          <p:cNvSpPr/>
-          <p:nvPr/>
-        </p:nvSpPr>
-        <p:spPr>
-          <a:xfrm>
-            <a:off x="5399103" y="4570124"/>
-            <a:ext cx="890482" cy="184168"/>
-          </a:xfrm>
-          <a:prstGeom prst="rightArrow">
-            <a:avLst>
-              <a:gd name="adj1" fmla="val 32000"/>
-              <a:gd name="adj2" fmla="val 157961"/>
-            </a:avLst>
-          </a:prstGeom>
-          <a:solidFill>
-            <a:srgbClr val="000000"/>
-          </a:solidFill>
-          <a:ln w="25400">
-            <a:solidFill>
-              <a:srgbClr val="4472C4"/>
-            </a:solidFill>
-          </a:ln>
-        </p:spPr>
-        <p:txBody>
-          <a:bodyPr lIns="45719" rIns="45719"/>
-          <a:lstStyle/>
-          <a:p>
-            <a:pPr>
-              <a:defRPr>
-                <a:latin typeface="Calibri"/>
-                <a:ea typeface="Calibri"/>
-                <a:cs typeface="Calibri"/>
-                <a:sym typeface="Calibri"/>
-              </a:defRPr>
-            </a:pPr>
-          </a:p>
-        </p:txBody>
-      </p:sp>
-      <p:sp>
-        <p:nvSpPr>
-          <p:cNvPr id="149" name="Arrow"/>
-          <p:cNvSpPr/>
-          <p:nvPr/>
-        </p:nvSpPr>
-        <p:spPr>
-          <a:xfrm>
-            <a:off x="5287886" y="1194688"/>
-            <a:ext cx="890483" cy="184169"/>
-          </a:xfrm>
-          <a:prstGeom prst="rightArrow">
-            <a:avLst>
-              <a:gd name="adj1" fmla="val 32000"/>
-              <a:gd name="adj2" fmla="val 157961"/>
-            </a:avLst>
-          </a:prstGeom>
-          <a:solidFill>
-            <a:srgbClr val="000000"/>
-          </a:solidFill>
-          <a:ln w="25400">
-            <a:solidFill>
-              <a:srgbClr val="4472C4"/>
-            </a:solidFill>
-          </a:ln>
-        </p:spPr>
-        <p:txBody>
-          <a:bodyPr lIns="45719" rIns="45719"/>
+          <a:bodyPr lIns="0" tIns="0" rIns="0" bIns="0"/>
           <a:lstStyle/>
           <a:p>
             <a:pPr>
@@ -4654,7 +4855,7 @@
       </p:grpSpPr>
       <p:pic>
         <p:nvPicPr>
-          <p:cNvPr id="151" name="Image" descr="Image"/>
+          <p:cNvPr id="155" name="Image" descr="Image"/>
           <p:cNvPicPr>
             <a:picLocks noChangeAspect="1"/>
           </p:cNvPicPr>
@@ -4683,7 +4884,7 @@
       </p:pic>
       <p:sp>
         <p:nvSpPr>
-          <p:cNvPr id="152" name="PlaceHolder 1"/>
+          <p:cNvPr id="156" name="PlaceHolder 1"/>
           <p:cNvSpPr txBox="1"/>
           <p:nvPr>
             <p:ph type="title"/>
@@ -4726,14 +4927,14 @@
       </p:sp>
       <p:sp>
         <p:nvSpPr>
-          <p:cNvPr id="153" name="Title 3"/>
+          <p:cNvPr id="157" name="Title 3"/>
           <p:cNvSpPr txBox="1"/>
           <p:nvPr/>
         </p:nvSpPr>
         <p:spPr>
           <a:xfrm>
-            <a:off x="217997" y="582020"/>
-            <a:ext cx="3634444" cy="2057318"/>
+            <a:off x="217996" y="582019"/>
+            <a:ext cx="3634446" cy="2057320"/>
           </a:xfrm>
           <a:prstGeom prst="rect">
             <a:avLst/>
@@ -4866,14 +5067,14 @@
       </p:sp>
       <p:sp>
         <p:nvSpPr>
-          <p:cNvPr id="154" name="Title 3"/>
+          <p:cNvPr id="158" name="Title 3"/>
           <p:cNvSpPr txBox="1"/>
           <p:nvPr/>
         </p:nvSpPr>
         <p:spPr>
           <a:xfrm>
-            <a:off x="4260015" y="3949244"/>
-            <a:ext cx="3820636" cy="2382251"/>
+            <a:off x="4260015" y="3949243"/>
+            <a:ext cx="3820637" cy="2382252"/>
           </a:xfrm>
           <a:prstGeom prst="rect">
             <a:avLst/>
@@ -4967,7 +5168,7 @@
       </p:sp>
       <p:pic>
         <p:nvPicPr>
-          <p:cNvPr id="155" name="Image" descr="Image"/>
+          <p:cNvPr id="159" name="Image" descr="Image"/>
           <p:cNvPicPr>
             <a:picLocks noChangeAspect="1"/>
           </p:cNvPicPr>
@@ -4984,7 +5185,7 @@
         <p:spPr>
           <a:xfrm>
             <a:off x="470266" y="3400449"/>
-            <a:ext cx="3412672" cy="2973833"/>
+            <a:ext cx="3412672" cy="2973834"/>
           </a:xfrm>
           <a:prstGeom prst="rect">
             <a:avLst/>
@@ -4996,7 +5197,7 @@
       </p:pic>
       <p:pic>
         <p:nvPicPr>
-          <p:cNvPr id="156" name="Image" descr="Image"/>
+          <p:cNvPr id="160" name="Image" descr="Image"/>
           <p:cNvPicPr>
             <a:picLocks noChangeAspect="1"/>
           </p:cNvPicPr>
@@ -5025,14 +5226,14 @@
       </p:pic>
       <p:sp>
         <p:nvSpPr>
-          <p:cNvPr id="157" name="Title 3"/>
+          <p:cNvPr id="161" name="Title 3"/>
           <p:cNvSpPr txBox="1"/>
           <p:nvPr/>
         </p:nvSpPr>
         <p:spPr>
           <a:xfrm>
-            <a:off x="8320095" y="462671"/>
-            <a:ext cx="3634443" cy="2472164"/>
+            <a:off x="8320095" y="462670"/>
+            <a:ext cx="3634444" cy="2472165"/>
           </a:xfrm>
           <a:prstGeom prst="rect">
             <a:avLst/>
@@ -5182,14 +5383,14 @@
       </p:sp>
       <p:sp>
         <p:nvSpPr>
-          <p:cNvPr id="158" name="Arrow 6"/>
+          <p:cNvPr id="162" name="Arrow 6"/>
           <p:cNvSpPr/>
           <p:nvPr/>
         </p:nvSpPr>
         <p:spPr>
           <a:xfrm>
-            <a:off x="1544397" y="2679076"/>
-            <a:ext cx="460097" cy="462752"/>
+            <a:off x="1544397" y="2679075"/>
+            <a:ext cx="460098" cy="462753"/>
           </a:xfrm>
           <a:custGeom>
             <a:avLst/>
@@ -5270,14 +5471,14 @@
       </p:sp>
       <p:sp>
         <p:nvSpPr>
-          <p:cNvPr id="159" name="Arrow 6"/>
+          <p:cNvPr id="163" name="Arrow 6"/>
           <p:cNvSpPr/>
           <p:nvPr/>
         </p:nvSpPr>
         <p:spPr>
           <a:xfrm>
             <a:off x="5920828" y="3194072"/>
-            <a:ext cx="460096" cy="462753"/>
+            <a:ext cx="460097" cy="462754"/>
           </a:xfrm>
           <a:custGeom>
             <a:avLst/>
@@ -5358,7 +5559,7 @@
       </p:sp>
       <p:pic>
         <p:nvPicPr>
-          <p:cNvPr id="160" name="Image" descr="Image"/>
+          <p:cNvPr id="164" name="Image" descr="Image"/>
           <p:cNvPicPr>
             <a:picLocks noChangeAspect="1"/>
           </p:cNvPicPr>
@@ -5374,8 +5575,8 @@
         </p:blipFill>
         <p:spPr>
           <a:xfrm>
-            <a:off x="8566676" y="3008224"/>
-            <a:ext cx="3141281" cy="2382253"/>
+            <a:off x="8566676" y="3008223"/>
+            <a:ext cx="3141282" cy="2382254"/>
           </a:xfrm>
           <a:prstGeom prst="rect">
             <a:avLst/>
@@ -5387,7 +5588,7 @@
       </p:pic>
       <p:pic>
         <p:nvPicPr>
-          <p:cNvPr id="161" name="Image" descr="Image"/>
+          <p:cNvPr id="165" name="Image" descr="Image"/>
           <p:cNvPicPr>
             <a:picLocks noChangeAspect="1"/>
           </p:cNvPicPr>
@@ -5404,7 +5605,7 @@
         <p:spPr>
           <a:xfrm>
             <a:off x="8566676" y="5463866"/>
-            <a:ext cx="3141281" cy="1621757"/>
+            <a:ext cx="3141282" cy="1621758"/>
           </a:xfrm>
           <a:prstGeom prst="rect">
             <a:avLst/>
@@ -5442,7 +5643,7 @@
       </p:grpSpPr>
       <p:pic>
         <p:nvPicPr>
-          <p:cNvPr id="163" name="Image" descr="Image"/>
+          <p:cNvPr id="167" name="Image" descr="Image"/>
           <p:cNvPicPr>
             <a:picLocks noChangeAspect="1"/>
           </p:cNvPicPr>
@@ -5471,7 +5672,7 @@
       </p:pic>
       <p:sp>
         <p:nvSpPr>
-          <p:cNvPr id="164" name="PlaceHolder 1"/>
+          <p:cNvPr id="168" name="PlaceHolder 1"/>
           <p:cNvSpPr txBox="1"/>
           <p:nvPr>
             <p:ph type="title"/>
@@ -5514,14 +5715,14 @@
       </p:sp>
       <p:sp>
         <p:nvSpPr>
-          <p:cNvPr id="165" name="Title 3"/>
+          <p:cNvPr id="169" name="Title 3"/>
           <p:cNvSpPr txBox="1"/>
           <p:nvPr/>
         </p:nvSpPr>
         <p:spPr>
           <a:xfrm>
-            <a:off x="230035" y="787718"/>
-            <a:ext cx="5003696" cy="2556459"/>
+            <a:off x="230034" y="787717"/>
+            <a:ext cx="5003698" cy="2556461"/>
           </a:xfrm>
           <a:prstGeom prst="rect">
             <a:avLst/>
@@ -5659,14 +5860,14 @@
       </p:sp>
       <p:sp>
         <p:nvSpPr>
-          <p:cNvPr id="166" name="Title 3"/>
+          <p:cNvPr id="170" name="Title 3"/>
           <p:cNvSpPr txBox="1"/>
           <p:nvPr/>
         </p:nvSpPr>
         <p:spPr>
           <a:xfrm>
-            <a:off x="29920" y="3810478"/>
-            <a:ext cx="5205666" cy="4108404"/>
+            <a:off x="29920" y="3810477"/>
+            <a:ext cx="5205666" cy="4108405"/>
           </a:xfrm>
           <a:prstGeom prst="rect">
             <a:avLst/>
@@ -5856,14 +6057,14 @@
       </p:sp>
       <p:sp>
         <p:nvSpPr>
-          <p:cNvPr id="167" name="Title 3"/>
+          <p:cNvPr id="171" name="Title 3"/>
           <p:cNvSpPr txBox="1"/>
           <p:nvPr/>
         </p:nvSpPr>
         <p:spPr>
           <a:xfrm>
-            <a:off x="5323773" y="4849896"/>
-            <a:ext cx="6953592" cy="932040"/>
+            <a:off x="5323773" y="4849895"/>
+            <a:ext cx="6953593" cy="932041"/>
           </a:xfrm>
           <a:prstGeom prst="rect">
             <a:avLst/>
@@ -5907,14 +6108,14 @@
       </p:sp>
       <p:sp>
         <p:nvSpPr>
-          <p:cNvPr id="168" name="Title 3"/>
+          <p:cNvPr id="172" name="Title 3"/>
           <p:cNvSpPr txBox="1"/>
           <p:nvPr/>
         </p:nvSpPr>
         <p:spPr>
           <a:xfrm>
-            <a:off x="6168383" y="581074"/>
-            <a:ext cx="5644536" cy="516959"/>
+            <a:off x="6168383" y="581073"/>
+            <a:ext cx="5644537" cy="516960"/>
           </a:xfrm>
           <a:prstGeom prst="rect">
             <a:avLst/>
@@ -5964,7 +6165,7 @@
       </p:sp>
       <p:pic>
         <p:nvPicPr>
-          <p:cNvPr id="169" name="Image" descr="Image"/>
+          <p:cNvPr id="173" name="Image" descr="Image"/>
           <p:cNvPicPr>
             <a:picLocks noChangeAspect="1"/>
           </p:cNvPicPr>
@@ -5981,7 +6182,7 @@
         <p:spPr>
           <a:xfrm>
             <a:off x="5449148" y="5257839"/>
-            <a:ext cx="6702842" cy="406960"/>
+            <a:ext cx="6702843" cy="406961"/>
           </a:xfrm>
           <a:prstGeom prst="rect">
             <a:avLst/>
@@ -5993,7 +6194,7 @@
       </p:pic>
       <p:pic>
         <p:nvPicPr>
-          <p:cNvPr id="170" name="Image" descr="Image"/>
+          <p:cNvPr id="174" name="Image" descr="Image"/>
           <p:cNvPicPr>
             <a:picLocks noChangeAspect="1"/>
           </p:cNvPicPr>
@@ -6010,7 +6211,7 @@
         <p:spPr>
           <a:xfrm>
             <a:off x="5559762" y="5807747"/>
-            <a:ext cx="6481614" cy="776299"/>
+            <a:ext cx="6481615" cy="776300"/>
           </a:xfrm>
           <a:prstGeom prst="rect">
             <a:avLst/>
@@ -6022,7 +6223,7 @@
       </p:pic>
       <p:pic>
         <p:nvPicPr>
-          <p:cNvPr id="171" name="Image" descr="Image"/>
+          <p:cNvPr id="175" name="Image" descr="Image"/>
           <p:cNvPicPr>
             <a:picLocks noChangeAspect="1"/>
           </p:cNvPicPr>
@@ -6039,7 +6240,7 @@
         <p:spPr>
           <a:xfrm>
             <a:off x="6267813" y="3891629"/>
-            <a:ext cx="4391238" cy="282682"/>
+            <a:ext cx="4391239" cy="282683"/>
           </a:xfrm>
           <a:prstGeom prst="rect">
             <a:avLst/>
@@ -6051,14 +6252,14 @@
       </p:pic>
       <p:sp>
         <p:nvSpPr>
-          <p:cNvPr id="172" name="Title 3"/>
+          <p:cNvPr id="176" name="Title 3"/>
           <p:cNvSpPr txBox="1"/>
           <p:nvPr/>
         </p:nvSpPr>
         <p:spPr>
           <a:xfrm>
-            <a:off x="6416059" y="3631776"/>
-            <a:ext cx="3010081" cy="260267"/>
+            <a:off x="6416059" y="3631775"/>
+            <a:ext cx="3010082" cy="260269"/>
           </a:xfrm>
           <a:prstGeom prst="rect">
             <a:avLst/>
@@ -6102,7 +6303,7 @@
       </p:sp>
       <p:pic>
         <p:nvPicPr>
-          <p:cNvPr id="173" name="Image" descr="Image"/>
+          <p:cNvPr id="177" name="Image" descr="Image"/>
           <p:cNvPicPr>
             <a:picLocks noChangeAspect="1"/>
           </p:cNvPicPr>
@@ -6119,7 +6320,7 @@
         <p:spPr>
           <a:xfrm>
             <a:off x="6490923" y="1310510"/>
-            <a:ext cx="3910238" cy="776298"/>
+            <a:ext cx="3910239" cy="776299"/>
           </a:xfrm>
           <a:prstGeom prst="rect">
             <a:avLst/>
@@ -6131,7 +6332,7 @@
       </p:pic>
       <p:sp>
         <p:nvSpPr>
-          <p:cNvPr id="174" name="Title 3"/>
+          <p:cNvPr id="178" name="Title 3"/>
           <p:cNvSpPr txBox="1"/>
           <p:nvPr/>
         </p:nvSpPr>
@@ -6181,7 +6382,7 @@
       </p:sp>
       <p:pic>
         <p:nvPicPr>
-          <p:cNvPr id="175" name="Image" descr="Image"/>
+          <p:cNvPr id="179" name="Image" descr="Image"/>
           <p:cNvPicPr>
             <a:picLocks noChangeAspect="1"/>
           </p:cNvPicPr>
@@ -6198,7 +6399,7 @@
         <p:spPr>
           <a:xfrm>
             <a:off x="6381084" y="2096626"/>
-            <a:ext cx="4152450" cy="260269"/>
+            <a:ext cx="4152451" cy="260270"/>
           </a:xfrm>
           <a:prstGeom prst="rect">
             <a:avLst/>
@@ -6210,7 +6411,7 @@
       </p:pic>
       <p:pic>
         <p:nvPicPr>
-          <p:cNvPr id="176" name="Image" descr="Image"/>
+          <p:cNvPr id="180" name="Image" descr="Image"/>
           <p:cNvPicPr>
             <a:picLocks noChangeAspect="1"/>
           </p:cNvPicPr>
@@ -6227,7 +6428,7 @@
         <p:spPr>
           <a:xfrm>
             <a:off x="6460078" y="2789918"/>
-            <a:ext cx="3971930" cy="389005"/>
+            <a:ext cx="3971931" cy="389006"/>
           </a:xfrm>
           <a:prstGeom prst="rect">
             <a:avLst/>
@@ -6239,14 +6440,14 @@
       </p:pic>
       <p:sp>
         <p:nvSpPr>
-          <p:cNvPr id="177" name="Title 3"/>
+          <p:cNvPr id="181" name="Title 3"/>
           <p:cNvSpPr txBox="1"/>
           <p:nvPr/>
         </p:nvSpPr>
         <p:spPr>
           <a:xfrm>
-            <a:off x="6427327" y="2591013"/>
-            <a:ext cx="3010080" cy="260268"/>
+            <a:off x="6427327" y="2591012"/>
+            <a:ext cx="3010081" cy="260269"/>
           </a:xfrm>
           <a:prstGeom prst="rect">
             <a:avLst/>
@@ -6290,7 +6491,7 @@
       </p:sp>
       <p:pic>
         <p:nvPicPr>
-          <p:cNvPr id="178" name="Image" descr="Image"/>
+          <p:cNvPr id="182" name="Image" descr="Image"/>
           <p:cNvPicPr>
             <a:picLocks noChangeAspect="1"/>
           </p:cNvPicPr>
@@ -6306,8 +6507,8 @@
         </p:blipFill>
         <p:spPr>
           <a:xfrm>
-            <a:off x="6381856" y="3161853"/>
-            <a:ext cx="4218503" cy="319771"/>
+            <a:off x="6381855" y="3161852"/>
+            <a:ext cx="4218504" cy="319772"/>
           </a:xfrm>
           <a:prstGeom prst="rect">
             <a:avLst/>
@@ -6319,7 +6520,7 @@
       </p:pic>
       <p:pic>
         <p:nvPicPr>
-          <p:cNvPr id="179" name="Image" descr="Image"/>
+          <p:cNvPr id="183" name="Image" descr="Image"/>
           <p:cNvPicPr>
             <a:picLocks noChangeAspect="1"/>
           </p:cNvPicPr>
@@ -6336,7 +6537,7 @@
         <p:spPr>
           <a:xfrm>
             <a:off x="6076086" y="4212942"/>
-            <a:ext cx="4894641" cy="313944"/>
+            <a:ext cx="4894642" cy="313945"/>
           </a:xfrm>
           <a:prstGeom prst="rect">
             <a:avLst/>
@@ -6374,7 +6575,7 @@
       </p:grpSpPr>
       <p:pic>
         <p:nvPicPr>
-          <p:cNvPr id="181" name="Image" descr="Image"/>
+          <p:cNvPr id="185" name="Image" descr="Image"/>
           <p:cNvPicPr>
             <a:picLocks noChangeAspect="1"/>
           </p:cNvPicPr>
@@ -6403,7 +6604,7 @@
       </p:pic>
       <p:sp>
         <p:nvSpPr>
-          <p:cNvPr id="182" name="PlaceHolder 1"/>
+          <p:cNvPr id="186" name="PlaceHolder 1"/>
           <p:cNvSpPr txBox="1"/>
           <p:nvPr>
             <p:ph type="title"/>
@@ -6446,14 +6647,14 @@
       </p:sp>
       <p:sp>
         <p:nvSpPr>
-          <p:cNvPr id="183" name="Title 3"/>
+          <p:cNvPr id="187" name="Title 3"/>
           <p:cNvSpPr txBox="1"/>
           <p:nvPr/>
         </p:nvSpPr>
         <p:spPr>
           <a:xfrm>
-            <a:off x="38160" y="741956"/>
-            <a:ext cx="8956293" cy="3335035"/>
+            <a:off x="38160" y="741955"/>
+            <a:ext cx="8956293" cy="3335037"/>
           </a:xfrm>
           <a:prstGeom prst="rect">
             <a:avLst/>
@@ -6637,14 +6838,14 @@
       </p:sp>
       <p:sp>
         <p:nvSpPr>
-          <p:cNvPr id="184" name="Title 3"/>
+          <p:cNvPr id="188" name="Title 3"/>
           <p:cNvSpPr txBox="1"/>
           <p:nvPr/>
         </p:nvSpPr>
         <p:spPr>
           <a:xfrm>
-            <a:off x="452584" y="4508883"/>
-            <a:ext cx="4255174" cy="2324569"/>
+            <a:off x="452584" y="4508882"/>
+            <a:ext cx="4255174" cy="2324570"/>
           </a:xfrm>
           <a:prstGeom prst="rect">
             <a:avLst/>
@@ -6702,14 +6903,14 @@
       </p:sp>
       <p:sp>
         <p:nvSpPr>
-          <p:cNvPr id="185" name="Title 3"/>
+          <p:cNvPr id="189" name="Title 3"/>
           <p:cNvSpPr txBox="1"/>
           <p:nvPr/>
         </p:nvSpPr>
         <p:spPr>
           <a:xfrm>
-            <a:off x="6024615" y="4802821"/>
-            <a:ext cx="4947879" cy="1925229"/>
+            <a:off x="6024614" y="4802821"/>
+            <a:ext cx="4947880" cy="1925230"/>
           </a:xfrm>
           <a:prstGeom prst="rect">
             <a:avLst/>
@@ -6755,45 +6956,36 @@
             <a:endParaRPr spc="-111" sz="1000"/>
           </a:p>
           <a:p>
-            <a:pPr lvl="1" indent="160018" defTabSz="640079">
+            <a:pPr lvl="1" indent="160017" defTabSz="640079">
               <a:lnSpc>
                 <a:spcPct val="90000"/>
               </a:lnSpc>
-              <a:defRPr sz="1000">
+              <a:defRPr cap="all" sz="1000">
                 <a:solidFill>
                   <a:srgbClr val="F9F99E"/>
                 </a:solidFill>
-                <a:latin typeface="Arial"/>
-                <a:ea typeface="Arial"/>
-                <a:cs typeface="Arial"/>
-                <a:sym typeface="Arial"/>
-              </a:defRPr>
-            </a:pPr>
-            <a:br>
-              <a:rPr cap="all">
                 <a:latin typeface="Copperplate"/>
                 <a:ea typeface="Copperplate"/>
                 <a:cs typeface="Copperplate"/>
                 <a:sym typeface="Copperplate"/>
-              </a:rPr>
+              </a:defRPr>
+            </a:pPr>
+            <a:br>
+              <a:rPr spc="-111"/>
             </a:br>
             <a:r>
-              <a:rPr cap="all" spc="-100" sz="900">
-                <a:latin typeface="Copperplate"/>
-                <a:ea typeface="Copperplate"/>
-                <a:cs typeface="Copperplate"/>
-                <a:sym typeface="Copperplate"/>
-              </a:rPr>
+              <a:rPr spc="-100" sz="900"/>
               <a:t>IN this final phase the multiplayer perceptron was introduced and using nn.linear and nn.relu layers were created to make predictions after training on the data. the loss function and optimizer helped to improve weights and Bias. It performed well enough to continue to be experimented on and to continue to attempt to improve by continued fine tuning of depth and width.</a:t>
             </a:r>
             <a:br>
-              <a:rPr cap="all" spc="-100" sz="900">
-                <a:latin typeface="Copperplate"/>
-                <a:ea typeface="Copperplate"/>
-                <a:cs typeface="Copperplate"/>
-                <a:sym typeface="Copperplate"/>
-              </a:rPr>
+              <a:rPr spc="-100" sz="900"/>
             </a:br>
+            <a:endParaRPr>
+              <a:latin typeface="Arial"/>
+              <a:ea typeface="Arial"/>
+              <a:cs typeface="Arial"/>
+              <a:sym typeface="Arial"/>
+            </a:endParaRPr>
           </a:p>
           <a:p>
             <a:pPr marL="242676" indent="-242676" defTabSz="640079">
@@ -6834,14 +7026,14 @@
       </p:sp>
       <p:sp>
         <p:nvSpPr>
-          <p:cNvPr id="186" name="Title 3"/>
+          <p:cNvPr id="190" name="Title 3"/>
           <p:cNvSpPr txBox="1"/>
           <p:nvPr/>
         </p:nvSpPr>
         <p:spPr>
           <a:xfrm>
-            <a:off x="265245" y="4106866"/>
-            <a:ext cx="11379963" cy="510840"/>
+            <a:off x="265244" y="4106865"/>
+            <a:ext cx="11379965" cy="510841"/>
           </a:xfrm>
           <a:prstGeom prst="rect">
             <a:avLst/>
@@ -6885,7 +7077,7 @@
       </p:sp>
       <p:pic>
         <p:nvPicPr>
-          <p:cNvPr id="187" name="Image" descr="Image"/>
+          <p:cNvPr id="191" name="Image" descr="Image"/>
           <p:cNvPicPr>
             <a:picLocks noChangeAspect="1"/>
           </p:cNvPicPr>
@@ -6901,8 +7093,8 @@
         </p:blipFill>
         <p:spPr>
           <a:xfrm>
-            <a:off x="9017420" y="1416830"/>
-            <a:ext cx="1712740" cy="610216"/>
+            <a:off x="9017420" y="1416829"/>
+            <a:ext cx="1712741" cy="610217"/>
           </a:xfrm>
           <a:prstGeom prst="rect">
             <a:avLst/>
@@ -6914,7 +7106,7 @@
       </p:pic>
       <p:pic>
         <p:nvPicPr>
-          <p:cNvPr id="188" name="Image" descr="Image"/>
+          <p:cNvPr id="192" name="Image" descr="Image"/>
           <p:cNvPicPr>
             <a:picLocks noChangeAspect="1"/>
           </p:cNvPicPr>
@@ -6931,7 +7123,7 @@
         <p:spPr>
           <a:xfrm>
             <a:off x="7822751" y="2242304"/>
-            <a:ext cx="3133172" cy="1837179"/>
+            <a:ext cx="3133173" cy="1837179"/>
           </a:xfrm>
           <a:prstGeom prst="rect">
             <a:avLst/>
@@ -6943,14 +7135,14 @@
       </p:pic>
       <p:sp>
         <p:nvSpPr>
-          <p:cNvPr id="189" name="Title 3"/>
+          <p:cNvPr id="193" name="Title 3"/>
           <p:cNvSpPr txBox="1"/>
           <p:nvPr/>
         </p:nvSpPr>
         <p:spPr>
           <a:xfrm>
             <a:off x="5325531" y="2101150"/>
-            <a:ext cx="2512223" cy="3130568"/>
+            <a:ext cx="2512224" cy="3130569"/>
           </a:xfrm>
           <a:prstGeom prst="rect">
             <a:avLst/>
@@ -7050,14 +7242,14 @@
     </a:clrScheme>
     <a:fontScheme name="Office Theme">
       <a:majorFont>
+        <a:latin typeface="Helvetica Neue"/>
+        <a:ea typeface="Helvetica Neue"/>
+        <a:cs typeface="Helvetica Neue"/>
+      </a:majorFont>
+      <a:minorFont>
         <a:latin typeface="Helvetica"/>
         <a:ea typeface="Helvetica"/>
         <a:cs typeface="Helvetica"/>
-      </a:majorFont>
-      <a:minorFont>
-        <a:latin typeface="Helvetica Neue"/>
-        <a:ea typeface="Helvetica Neue"/>
-        <a:cs typeface="Helvetica Neue"/>
       </a:minorFont>
     </a:fontScheme>
     <a:fmtScheme name="Office Theme">
@@ -7238,9 +7430,9 @@
             </a:solidFill>
             <a:effectLst/>
             <a:uFillTx/>
-            <a:latin typeface="+mn-lt"/>
-            <a:ea typeface="+mn-ea"/>
-            <a:cs typeface="+mn-cs"/>
+            <a:latin typeface="+mj-lt"/>
+            <a:ea typeface="+mj-ea"/>
+            <a:cs typeface="+mj-cs"/>
             <a:sym typeface="Helvetica Neue"/>
           </a:defRPr>
         </a:defPPr>
@@ -7809,9 +8001,9 @@
             </a:solidFill>
             <a:effectLst/>
             <a:uFillTx/>
-            <a:latin typeface="+mn-lt"/>
-            <a:ea typeface="+mn-ea"/>
-            <a:cs typeface="+mn-cs"/>
+            <a:latin typeface="+mj-lt"/>
+            <a:ea typeface="+mj-ea"/>
+            <a:cs typeface="+mj-cs"/>
             <a:sym typeface="Helvetica Neue"/>
           </a:defRPr>
         </a:defPPr>
@@ -8104,14 +8296,14 @@
     </a:clrScheme>
     <a:fontScheme name="Office Theme">
       <a:majorFont>
+        <a:latin typeface="Helvetica Neue"/>
+        <a:ea typeface="Helvetica Neue"/>
+        <a:cs typeface="Helvetica Neue"/>
+      </a:majorFont>
+      <a:minorFont>
         <a:latin typeface="Helvetica"/>
         <a:ea typeface="Helvetica"/>
         <a:cs typeface="Helvetica"/>
-      </a:majorFont>
-      <a:minorFont>
-        <a:latin typeface="Helvetica Neue"/>
-        <a:ea typeface="Helvetica Neue"/>
-        <a:cs typeface="Helvetica Neue"/>
       </a:minorFont>
     </a:fontScheme>
     <a:fmtScheme name="Office Theme">
@@ -8292,9 +8484,9 @@
             </a:solidFill>
             <a:effectLst/>
             <a:uFillTx/>
-            <a:latin typeface="+mn-lt"/>
-            <a:ea typeface="+mn-ea"/>
-            <a:cs typeface="+mn-cs"/>
+            <a:latin typeface="+mj-lt"/>
+            <a:ea typeface="+mj-ea"/>
+            <a:cs typeface="+mj-cs"/>
             <a:sym typeface="Helvetica Neue"/>
           </a:defRPr>
         </a:defPPr>
@@ -8863,9 +9055,9 @@
             </a:solidFill>
             <a:effectLst/>
             <a:uFillTx/>
-            <a:latin typeface="+mn-lt"/>
-            <a:ea typeface="+mn-ea"/>
-            <a:cs typeface="+mn-cs"/>
+            <a:latin typeface="+mj-lt"/>
+            <a:ea typeface="+mj-ea"/>
+            <a:cs typeface="+mj-cs"/>
             <a:sym typeface="Helvetica Neue"/>
           </a:defRPr>
         </a:defPPr>

</xml_diff>